<commit_message>
update merge all covs
</commit_message>
<xml_diff>
--- a/BDSI22_DM_STICOVID_Poster.pptx
+++ b/BDSI22_DM_STICOVID_Poster.pptx
@@ -6897,11 +6897,14 @@
           <a:p>
             <a:pPr algn="just"/>
             <a:r>
-              <a:rPr lang="en-US" b="0" baseline="0" dirty="0">
+              <a:rPr lang="en-US" b="0" baseline="0">
                 <a:latin typeface="Calibri" panose="020F0502020204030204" pitchFamily="34" charset="0"/>
               </a:rPr>
-              <a:t>Insert background here</a:t>
-            </a:r>
+              <a:t>Sexually transmitted in</a:t>
+            </a:r>
+            <a:endParaRPr lang="en-US" b="0" baseline="0" dirty="0">
+              <a:latin typeface="Calibri" panose="020F0502020204030204" pitchFamily="34" charset="0"/>
+            </a:endParaRPr>
           </a:p>
         </p:txBody>
       </p:sp>

</xml_diff>